<commit_message>
no statistics in pwod10
</commit_message>
<xml_diff>
--- a/morea/materials/14b-files.pptx
+++ b/morea/materials/14b-files.pptx
@@ -264,7 +264,7 @@
             <a:fld id="{26F0AA15-DA75-F04C-BBBF-C905B5F21D0A}" type="datetime1">
               <a:rPr lang="en-US"/>
               <a:pPr/>
-              <a:t>10/28/14</a:t>
+              <a:t>4/17/15</a:t>
             </a:fld>
             <a:endParaRPr lang="en-US"/>
           </a:p>
@@ -8029,16 +8029,18 @@
           <a:lstStyle/>
           <a:p>
             <a:r>
+              <a:rPr lang="en-US" dirty="0" smtClean="0"/>
+              <a:t>Dr. </a:t>
+            </a:r>
+            <a:r>
               <a:rPr lang="en-US" smtClean="0"/>
-              <a:t>Dr. Emily Hill</a:t>
-            </a:r>
-          </a:p>
-          <a:p>
+              <a:t>Emily </a:t>
+            </a:r>
             <a:r>
               <a:rPr lang="en-US" smtClean="0"/>
-              <a:t>Fall 2014</a:t>
-            </a:r>
-            <a:endParaRPr lang="en-US" dirty="0"/>
+              <a:t>Hill</a:t>
+            </a:r>
+            <a:endParaRPr lang="en-US" dirty="0" smtClean="0"/>
           </a:p>
         </p:txBody>
       </p:sp>
@@ -14206,7 +14208,6 @@
               <a:rPr lang="en-US" sz="3600" dirty="0" smtClean="0"/>
               <a:t>Exam Statistics</a:t>
             </a:r>
-            <a:endParaRPr lang="en-US" sz="3600" dirty="0" smtClean="0"/>
           </a:p>
           <a:p>
             <a:pPr marL="0" indent="0">

</xml_diff>